<commit_message>
Slide update week 8
</commit_message>
<xml_diff>
--- a/in_class_slides/geog4300_W08-1 Hypotheses and one sample tests.pptx
+++ b/in_class_slides/geog4300_W08-1 Hypotheses and one sample tests.pptx
@@ -220,7 +220,7 @@
           <a:p>
             <a:fld id="{F1C23026-85D4-48E8-9219-18000F688023}" type="datetimeFigureOut">
               <a:rPr lang="en-US" smtClean="0"/>
-              <a:t>10/9/2024</a:t>
+              <a:t>10/15/2024</a:t>
             </a:fld>
             <a:endParaRPr lang="en-US"/>
           </a:p>
@@ -4852,7 +4852,7 @@
           <a:p>
             <a:fld id="{93C8B963-0F36-48FC-991E-AA63861DA924}" type="datetimeFigureOut">
               <a:rPr lang="en-US" smtClean="0"/>
-              <a:t>10/9/2024</a:t>
+              <a:t>10/15/2024</a:t>
             </a:fld>
             <a:endParaRPr lang="en-US"/>
           </a:p>
@@ -5150,7 +5150,7 @@
           <a:p>
             <a:fld id="{93C8B963-0F36-48FC-991E-AA63861DA924}" type="datetimeFigureOut">
               <a:rPr lang="en-US" smtClean="0"/>
-              <a:t>10/9/2024</a:t>
+              <a:t>10/15/2024</a:t>
             </a:fld>
             <a:endParaRPr lang="en-US"/>
           </a:p>
@@ -5342,7 +5342,7 @@
           <a:p>
             <a:fld id="{93C8B963-0F36-48FC-991E-AA63861DA924}" type="datetimeFigureOut">
               <a:rPr lang="en-US" smtClean="0"/>
-              <a:t>10/9/2024</a:t>
+              <a:t>10/15/2024</a:t>
             </a:fld>
             <a:endParaRPr lang="en-US"/>
           </a:p>
@@ -5603,7 +5603,7 @@
           <a:p>
             <a:fld id="{93C8B963-0F36-48FC-991E-AA63861DA924}" type="datetimeFigureOut">
               <a:rPr lang="en-US" smtClean="0"/>
-              <a:t>10/9/2024</a:t>
+              <a:t>10/15/2024</a:t>
             </a:fld>
             <a:endParaRPr lang="en-US"/>
           </a:p>
@@ -6027,7 +6027,7 @@
           <a:p>
             <a:fld id="{93C8B963-0F36-48FC-991E-AA63861DA924}" type="datetimeFigureOut">
               <a:rPr lang="en-US" smtClean="0"/>
-              <a:t>10/9/2024</a:t>
+              <a:t>10/15/2024</a:t>
             </a:fld>
             <a:endParaRPr lang="en-US"/>
           </a:p>
@@ -6564,7 +6564,7 @@
           <a:p>
             <a:fld id="{93C8B963-0F36-48FC-991E-AA63861DA924}" type="datetimeFigureOut">
               <a:rPr lang="en-US" smtClean="0"/>
-              <a:t>10/9/2024</a:t>
+              <a:t>10/15/2024</a:t>
             </a:fld>
             <a:endParaRPr lang="en-US"/>
           </a:p>
@@ -7428,7 +7428,7 @@
           <a:p>
             <a:fld id="{93C8B963-0F36-48FC-991E-AA63861DA924}" type="datetimeFigureOut">
               <a:rPr lang="en-US" smtClean="0"/>
-              <a:t>10/9/2024</a:t>
+              <a:t>10/15/2024</a:t>
             </a:fld>
             <a:endParaRPr lang="en-US"/>
           </a:p>
@@ -7598,7 +7598,7 @@
           <a:p>
             <a:fld id="{93C8B963-0F36-48FC-991E-AA63861DA924}" type="datetimeFigureOut">
               <a:rPr lang="en-US" smtClean="0"/>
-              <a:t>10/9/2024</a:t>
+              <a:t>10/15/2024</a:t>
             </a:fld>
             <a:endParaRPr lang="en-US"/>
           </a:p>
@@ -7782,7 +7782,7 @@
           <a:p>
             <a:fld id="{93C8B963-0F36-48FC-991E-AA63861DA924}" type="datetimeFigureOut">
               <a:rPr lang="en-US" smtClean="0"/>
-              <a:t>10/9/2024</a:t>
+              <a:t>10/15/2024</a:t>
             </a:fld>
             <a:endParaRPr lang="en-US"/>
           </a:p>
@@ -7952,7 +7952,7 @@
           <a:p>
             <a:fld id="{93C8B963-0F36-48FC-991E-AA63861DA924}" type="datetimeFigureOut">
               <a:rPr lang="en-US" smtClean="0"/>
-              <a:t>10/9/2024</a:t>
+              <a:t>10/15/2024</a:t>
             </a:fld>
             <a:endParaRPr lang="en-US"/>
           </a:p>
@@ -8196,7 +8196,7 @@
           <a:p>
             <a:fld id="{93C8B963-0F36-48FC-991E-AA63861DA924}" type="datetimeFigureOut">
               <a:rPr lang="en-US" smtClean="0"/>
-              <a:t>10/9/2024</a:t>
+              <a:t>10/15/2024</a:t>
             </a:fld>
             <a:endParaRPr lang="en-US"/>
           </a:p>
@@ -8432,7 +8432,7 @@
           <a:p>
             <a:fld id="{93C8B963-0F36-48FC-991E-AA63861DA924}" type="datetimeFigureOut">
               <a:rPr lang="en-US" smtClean="0"/>
-              <a:t>10/9/2024</a:t>
+              <a:t>10/15/2024</a:t>
             </a:fld>
             <a:endParaRPr lang="en-US"/>
           </a:p>
@@ -8898,7 +8898,7 @@
           <a:p>
             <a:fld id="{93C8B963-0F36-48FC-991E-AA63861DA924}" type="datetimeFigureOut">
               <a:rPr lang="en-US" smtClean="0"/>
-              <a:t>10/9/2024</a:t>
+              <a:t>10/15/2024</a:t>
             </a:fld>
             <a:endParaRPr lang="en-US"/>
           </a:p>
@@ -9016,7 +9016,7 @@
           <a:p>
             <a:fld id="{93C8B963-0F36-48FC-991E-AA63861DA924}" type="datetimeFigureOut">
               <a:rPr lang="en-US" smtClean="0"/>
-              <a:t>10/9/2024</a:t>
+              <a:t>10/15/2024</a:t>
             </a:fld>
             <a:endParaRPr lang="en-US"/>
           </a:p>
@@ -9111,7 +9111,7 @@
           <a:p>
             <a:fld id="{93C8B963-0F36-48FC-991E-AA63861DA924}" type="datetimeFigureOut">
               <a:rPr lang="en-US" smtClean="0"/>
-              <a:t>10/9/2024</a:t>
+              <a:t>10/15/2024</a:t>
             </a:fld>
             <a:endParaRPr lang="en-US"/>
           </a:p>
@@ -9366,7 +9366,7 @@
           <a:p>
             <a:fld id="{93C8B963-0F36-48FC-991E-AA63861DA924}" type="datetimeFigureOut">
               <a:rPr lang="en-US" smtClean="0"/>
-              <a:t>10/9/2024</a:t>
+              <a:t>10/15/2024</a:t>
             </a:fld>
             <a:endParaRPr lang="en-US"/>
           </a:p>
@@ -9666,7 +9666,7 @@
           <a:p>
             <a:fld id="{93C8B963-0F36-48FC-991E-AA63861DA924}" type="datetimeFigureOut">
               <a:rPr lang="en-US" smtClean="0"/>
-              <a:t>10/9/2024</a:t>
+              <a:t>10/15/2024</a:t>
             </a:fld>
             <a:endParaRPr lang="en-US"/>
           </a:p>
@@ -9900,7 +9900,7 @@
           <a:p>
             <a:fld id="{93C8B963-0F36-48FC-991E-AA63861DA924}" type="datetimeFigureOut">
               <a:rPr lang="en-US" smtClean="0"/>
-              <a:t>10/9/2024</a:t>
+              <a:t>10/15/2024</a:t>
             </a:fld>
             <a:endParaRPr lang="en-US"/>
           </a:p>
@@ -11665,6 +11665,191 @@
           </a:prstGeom>
         </p:spPr>
       </p:pic>
+      <mc:AlternateContent xmlns:mc="http://schemas.openxmlformats.org/markup-compatibility/2006">
+        <mc:Choice xmlns:a14="http://schemas.microsoft.com/office/drawing/2010/main" Requires="a14">
+          <p:sp>
+            <p:nvSpPr>
+              <p:cNvPr id="5" name="TextBox 4">
+                <a:extLst>
+                  <a:ext uri="{FF2B5EF4-FFF2-40B4-BE49-F238E27FC236}">
+                    <a16:creationId xmlns:a16="http://schemas.microsoft.com/office/drawing/2014/main" id="{D409706E-F3C8-431C-B32E-81656C315846}"/>
+                  </a:ext>
+                </a:extLst>
+              </p:cNvPr>
+              <p:cNvSpPr txBox="1"/>
+              <p:nvPr/>
+            </p:nvSpPr>
+            <p:spPr>
+              <a:xfrm>
+                <a:off x="3436807" y="5141323"/>
+                <a:ext cx="2431884" cy="1533112"/>
+              </a:xfrm>
+              <a:prstGeom prst="rect">
+                <a:avLst/>
+              </a:prstGeom>
+              <a:noFill/>
+            </p:spPr>
+            <p:txBody>
+              <a:bodyPr wrap="none" lIns="0" tIns="0" rIns="0" bIns="0" rtlCol="0">
+                <a:spAutoFit/>
+              </a:bodyPr>
+              <a:lstStyle/>
+              <a:p>
+                <a:pPr/>
+                <a14:m>
+                  <m:oMathPara xmlns:m="http://schemas.openxmlformats.org/officeDocument/2006/math">
+                    <m:oMathParaPr>
+                      <m:jc m:val="centerGroup"/>
+                    </m:oMathParaPr>
+                    <m:oMath xmlns:m="http://schemas.openxmlformats.org/officeDocument/2006/math">
+                      <m:r>
+                        <a:rPr lang="en-US" sz="4000" b="0" i="1" smtClean="0">
+                          <a:latin typeface="Cambria Math" panose="02040503050406030204" pitchFamily="18" charset="0"/>
+                        </a:rPr>
+                        <m:t>𝑡</m:t>
+                      </m:r>
+                      <m:r>
+                        <a:rPr lang="en-US" sz="4000" b="0" i="1" smtClean="0">
+                          <a:latin typeface="Cambria Math" panose="02040503050406030204" pitchFamily="18" charset="0"/>
+                        </a:rPr>
+                        <m:t>=</m:t>
+                      </m:r>
+                      <m:f>
+                        <m:fPr>
+                          <m:ctrlPr>
+                            <a:rPr lang="en-US" sz="4000" b="0" i="1" smtClean="0">
+                              <a:latin typeface="Cambria Math" panose="02040503050406030204" pitchFamily="18" charset="0"/>
+                            </a:rPr>
+                          </m:ctrlPr>
+                        </m:fPr>
+                        <m:num>
+                          <m:acc>
+                            <m:accPr>
+                              <m:chr m:val="̅"/>
+                              <m:ctrlPr>
+                                <a:rPr lang="en-US" sz="4000" b="0" i="1" smtClean="0">
+                                  <a:latin typeface="Cambria Math" panose="02040503050406030204" pitchFamily="18" charset="0"/>
+                                </a:rPr>
+                              </m:ctrlPr>
+                            </m:accPr>
+                            <m:e>
+                              <m:r>
+                                <a:rPr lang="en-US" sz="4000" b="0" i="1" smtClean="0">
+                                  <a:latin typeface="Cambria Math" panose="02040503050406030204" pitchFamily="18" charset="0"/>
+                                </a:rPr>
+                                <m:t>𝑥</m:t>
+                              </m:r>
+                            </m:e>
+                          </m:acc>
+                          <m:r>
+                            <a:rPr lang="en-US" sz="4000" b="0" i="1" smtClean="0">
+                              <a:latin typeface="Cambria Math" panose="02040503050406030204" pitchFamily="18" charset="0"/>
+                            </a:rPr>
+                            <m:t> − </m:t>
+                          </m:r>
+                          <m:r>
+                            <a:rPr lang="en-US" sz="4000" b="0" i="1" smtClean="0">
+                              <a:latin typeface="Cambria Math" panose="02040503050406030204" pitchFamily="18" charset="0"/>
+                              <a:ea typeface="Cambria Math" panose="02040503050406030204" pitchFamily="18" charset="0"/>
+                            </a:rPr>
+                            <m:t>𝜇</m:t>
+                          </m:r>
+                        </m:num>
+                        <m:den>
+                          <m:f>
+                            <m:fPr>
+                              <m:type m:val="skw"/>
+                              <m:ctrlPr>
+                                <a:rPr lang="en-US" sz="4000" b="0" i="1" smtClean="0">
+                                  <a:latin typeface="Cambria Math" panose="02040503050406030204" pitchFamily="18" charset="0"/>
+                                </a:rPr>
+                              </m:ctrlPr>
+                            </m:fPr>
+                            <m:num>
+                              <m:r>
+                                <a:rPr lang="en-US" sz="4000" b="0" i="1" smtClean="0">
+                                  <a:latin typeface="Cambria Math" panose="02040503050406030204" pitchFamily="18" charset="0"/>
+                                </a:rPr>
+                                <m:t>𝑠</m:t>
+                              </m:r>
+                            </m:num>
+                            <m:den>
+                              <m:rad>
+                                <m:radPr>
+                                  <m:degHide m:val="on"/>
+                                  <m:ctrlPr>
+                                    <a:rPr lang="en-US" sz="4000" b="0" i="1" smtClean="0">
+                                      <a:latin typeface="Cambria Math" panose="02040503050406030204" pitchFamily="18" charset="0"/>
+                                    </a:rPr>
+                                  </m:ctrlPr>
+                                </m:radPr>
+                                <m:deg/>
+                                <m:e>
+                                  <m:r>
+                                    <a:rPr lang="en-US" sz="4000" b="0" i="1" smtClean="0">
+                                      <a:latin typeface="Cambria Math" panose="02040503050406030204" pitchFamily="18" charset="0"/>
+                                    </a:rPr>
+                                    <m:t>𝑛</m:t>
+                                  </m:r>
+                                </m:e>
+                              </m:rad>
+                            </m:den>
+                          </m:f>
+                        </m:den>
+                      </m:f>
+                    </m:oMath>
+                  </m:oMathPara>
+                </a14:m>
+                <a:endParaRPr lang="en-US" sz="4000" dirty="0"/>
+              </a:p>
+            </p:txBody>
+          </p:sp>
+        </mc:Choice>
+        <mc:Fallback>
+          <p:sp>
+            <p:nvSpPr>
+              <p:cNvPr id="5" name="TextBox 4">
+                <a:extLst>
+                  <a:ext uri="{FF2B5EF4-FFF2-40B4-BE49-F238E27FC236}">
+                    <a16:creationId xmlns:a16="http://schemas.microsoft.com/office/drawing/2014/main" id="{D409706E-F3C8-431C-B32E-81656C315846}"/>
+                  </a:ext>
+                </a:extLst>
+              </p:cNvPr>
+              <p:cNvSpPr txBox="1">
+                <a:spLocks noRot="1" noChangeAspect="1" noMove="1" noResize="1" noEditPoints="1" noAdjustHandles="1" noChangeArrowheads="1" noChangeShapeType="1" noTextEdit="1"/>
+              </p:cNvSpPr>
+              <p:nvPr/>
+            </p:nvSpPr>
+            <p:spPr>
+              <a:xfrm>
+                <a:off x="3436807" y="5141323"/>
+                <a:ext cx="2431884" cy="1533112"/>
+              </a:xfrm>
+              <a:prstGeom prst="rect">
+                <a:avLst/>
+              </a:prstGeom>
+              <a:blipFill>
+                <a:blip r:embed="rId4"/>
+                <a:stretch>
+                  <a:fillRect/>
+                </a:stretch>
+              </a:blipFill>
+            </p:spPr>
+            <p:txBody>
+              <a:bodyPr/>
+              <a:lstStyle/>
+              <a:p>
+                <a:r>
+                  <a:rPr lang="en-US">
+                    <a:noFill/>
+                  </a:rPr>
+                  <a:t> </a:t>
+                </a:r>
+              </a:p>
+            </p:txBody>
+          </p:sp>
+        </mc:Fallback>
+      </mc:AlternateContent>
     </p:spTree>
     <p:extLst>
       <p:ext uri="{BB962C8B-B14F-4D97-AF65-F5344CB8AC3E}">
@@ -24322,7 +24507,7 @@
               <a:buSzPct val="25000"/>
             </a:pPr>
             <a:r>
-              <a:rPr lang="en-US" sz="4000" b="1">
+              <a:rPr lang="en-US" sz="4000" b="1" dirty="0">
                 <a:ea typeface="Gill Sans MT"/>
                 <a:cs typeface="Gill Sans MT"/>
                 <a:sym typeface="Gill Sans MT"/>
@@ -24372,197 +24557,12 @@
           </a:p>
         </p:txBody>
       </p:sp>
-      <mc:AlternateContent xmlns:mc="http://schemas.openxmlformats.org/markup-compatibility/2006">
-        <mc:Choice xmlns:a14="http://schemas.microsoft.com/office/drawing/2010/main" Requires="a14">
-          <p:sp>
-            <p:nvSpPr>
-              <p:cNvPr id="6" name="TextBox 5">
-                <a:extLst>
-                  <a:ext uri="{FF2B5EF4-FFF2-40B4-BE49-F238E27FC236}">
-                    <a16:creationId xmlns:a16="http://schemas.microsoft.com/office/drawing/2014/main" id="{C8BFE09F-04DE-4037-8FA2-046977E0F2F6}"/>
-                  </a:ext>
-                </a:extLst>
-              </p:cNvPr>
-              <p:cNvSpPr txBox="1"/>
-              <p:nvPr/>
-            </p:nvSpPr>
-            <p:spPr>
-              <a:xfrm>
-                <a:off x="769894" y="1867244"/>
-                <a:ext cx="2431884" cy="1533112"/>
-              </a:xfrm>
-              <a:prstGeom prst="rect">
-                <a:avLst/>
-              </a:prstGeom>
-              <a:noFill/>
-            </p:spPr>
-            <p:txBody>
-              <a:bodyPr wrap="none" lIns="0" tIns="0" rIns="0" bIns="0" rtlCol="0">
-                <a:spAutoFit/>
-              </a:bodyPr>
-              <a:lstStyle/>
-              <a:p>
-                <a:pPr/>
-                <a14:m>
-                  <m:oMathPara xmlns:m="http://schemas.openxmlformats.org/officeDocument/2006/math">
-                    <m:oMathParaPr>
-                      <m:jc m:val="centerGroup"/>
-                    </m:oMathParaPr>
-                    <m:oMath xmlns:m="http://schemas.openxmlformats.org/officeDocument/2006/math">
-                      <m:r>
-                        <a:rPr lang="en-US" sz="4000" b="0" i="1" smtClean="0">
-                          <a:latin typeface="Cambria Math" panose="02040503050406030204" pitchFamily="18" charset="0"/>
-                        </a:rPr>
-                        <m:t>𝑡</m:t>
-                      </m:r>
-                      <m:r>
-                        <a:rPr lang="en-US" sz="4000" b="0" i="1" smtClean="0">
-                          <a:latin typeface="Cambria Math" panose="02040503050406030204" pitchFamily="18" charset="0"/>
-                        </a:rPr>
-                        <m:t>=</m:t>
-                      </m:r>
-                      <m:f>
-                        <m:fPr>
-                          <m:ctrlPr>
-                            <a:rPr lang="en-US" sz="4000" b="0" i="1" smtClean="0">
-                              <a:latin typeface="Cambria Math" panose="02040503050406030204" pitchFamily="18" charset="0"/>
-                            </a:rPr>
-                          </m:ctrlPr>
-                        </m:fPr>
-                        <m:num>
-                          <m:acc>
-                            <m:accPr>
-                              <m:chr m:val="̅"/>
-                              <m:ctrlPr>
-                                <a:rPr lang="en-US" sz="4000" b="0" i="1" smtClean="0">
-                                  <a:latin typeface="Cambria Math" panose="02040503050406030204" pitchFamily="18" charset="0"/>
-                                </a:rPr>
-                              </m:ctrlPr>
-                            </m:accPr>
-                            <m:e>
-                              <m:r>
-                                <a:rPr lang="en-US" sz="4000" b="0" i="1" smtClean="0">
-                                  <a:latin typeface="Cambria Math" panose="02040503050406030204" pitchFamily="18" charset="0"/>
-                                </a:rPr>
-                                <m:t>𝑥</m:t>
-                              </m:r>
-                            </m:e>
-                          </m:acc>
-                          <m:r>
-                            <a:rPr lang="en-US" sz="4000" b="0" i="1" smtClean="0">
-                              <a:latin typeface="Cambria Math" panose="02040503050406030204" pitchFamily="18" charset="0"/>
-                            </a:rPr>
-                            <m:t> − </m:t>
-                          </m:r>
-                          <m:r>
-                            <a:rPr lang="en-US" sz="4000" b="0" i="1" smtClean="0">
-                              <a:latin typeface="Cambria Math" panose="02040503050406030204" pitchFamily="18" charset="0"/>
-                              <a:ea typeface="Cambria Math" panose="02040503050406030204" pitchFamily="18" charset="0"/>
-                            </a:rPr>
-                            <m:t>𝜇</m:t>
-                          </m:r>
-                        </m:num>
-                        <m:den>
-                          <m:f>
-                            <m:fPr>
-                              <m:type m:val="skw"/>
-                              <m:ctrlPr>
-                                <a:rPr lang="en-US" sz="4000" b="0" i="1" smtClean="0">
-                                  <a:latin typeface="Cambria Math" panose="02040503050406030204" pitchFamily="18" charset="0"/>
-                                </a:rPr>
-                              </m:ctrlPr>
-                            </m:fPr>
-                            <m:num>
-                              <m:r>
-                                <a:rPr lang="en-US" sz="4000" b="0" i="1" smtClean="0">
-                                  <a:latin typeface="Cambria Math" panose="02040503050406030204" pitchFamily="18" charset="0"/>
-                                </a:rPr>
-                                <m:t>𝑠</m:t>
-                              </m:r>
-                            </m:num>
-                            <m:den>
-                              <m:rad>
-                                <m:radPr>
-                                  <m:degHide m:val="on"/>
-                                  <m:ctrlPr>
-                                    <a:rPr lang="en-US" sz="4000" b="0" i="1" smtClean="0">
-                                      <a:latin typeface="Cambria Math" panose="02040503050406030204" pitchFamily="18" charset="0"/>
-                                    </a:rPr>
-                                  </m:ctrlPr>
-                                </m:radPr>
-                                <m:deg/>
-                                <m:e>
-                                  <m:r>
-                                    <a:rPr lang="en-US" sz="4000" b="0" i="1" smtClean="0">
-                                      <a:latin typeface="Cambria Math" panose="02040503050406030204" pitchFamily="18" charset="0"/>
-                                    </a:rPr>
-                                    <m:t>𝑛</m:t>
-                                  </m:r>
-                                </m:e>
-                              </m:rad>
-                            </m:den>
-                          </m:f>
-                        </m:den>
-                      </m:f>
-                    </m:oMath>
-                  </m:oMathPara>
-                </a14:m>
-                <a:endParaRPr lang="en-US" sz="4000" dirty="0"/>
-              </a:p>
-            </p:txBody>
-          </p:sp>
-        </mc:Choice>
-        <mc:Fallback>
-          <p:sp>
-            <p:nvSpPr>
-              <p:cNvPr id="6" name="TextBox 5">
-                <a:extLst>
-                  <a:ext uri="{FF2B5EF4-FFF2-40B4-BE49-F238E27FC236}">
-                    <a16:creationId xmlns:a16="http://schemas.microsoft.com/office/drawing/2014/main" id="{C8BFE09F-04DE-4037-8FA2-046977E0F2F6}"/>
-                  </a:ext>
-                </a:extLst>
-              </p:cNvPr>
-              <p:cNvSpPr txBox="1">
-                <a:spLocks noRot="1" noChangeAspect="1" noMove="1" noResize="1" noEditPoints="1" noAdjustHandles="1" noChangeArrowheads="1" noChangeShapeType="1" noTextEdit="1"/>
-              </p:cNvSpPr>
-              <p:nvPr/>
-            </p:nvSpPr>
-            <p:spPr>
-              <a:xfrm>
-                <a:off x="769894" y="1867244"/>
-                <a:ext cx="2431884" cy="1533112"/>
-              </a:xfrm>
-              <a:prstGeom prst="rect">
-                <a:avLst/>
-              </a:prstGeom>
-              <a:blipFill>
-                <a:blip r:embed="rId3"/>
-                <a:stretch>
-                  <a:fillRect/>
-                </a:stretch>
-              </a:blipFill>
-            </p:spPr>
-            <p:txBody>
-              <a:bodyPr/>
-              <a:lstStyle/>
-              <a:p>
-                <a:r>
-                  <a:rPr lang="en-US">
-                    <a:noFill/>
-                  </a:rPr>
-                  <a:t> </a:t>
-                </a:r>
-              </a:p>
-            </p:txBody>
-          </p:sp>
-        </mc:Fallback>
-      </mc:AlternateContent>
       <p:pic>
         <p:nvPicPr>
-          <p:cNvPr id="5" name="Picture 4">
+          <p:cNvPr id="4" name="Picture 3">
             <a:extLst>
               <a:ext uri="{FF2B5EF4-FFF2-40B4-BE49-F238E27FC236}">
-                <a16:creationId xmlns:a16="http://schemas.microsoft.com/office/drawing/2014/main" id="{01815CCC-0CA6-498A-83B4-579122960DC7}"/>
+                <a16:creationId xmlns:a16="http://schemas.microsoft.com/office/drawing/2014/main" id="{8BB346CA-0C4A-4799-9F7F-E0258BF65DE9}"/>
               </a:ext>
             </a:extLst>
           </p:cNvPr>
@@ -24571,21 +24571,22 @@
           </p:cNvPicPr>
           <p:nvPr/>
         </p:nvPicPr>
-        <p:blipFill rotWithShape="1">
-          <a:blip r:embed="rId4">
+        <p:blipFill>
+          <a:blip r:embed="rId3">
             <a:extLst>
               <a:ext uri="{28A0092B-C50C-407E-A947-70E740481C1C}">
                 <a14:useLocalDpi xmlns:a14="http://schemas.microsoft.com/office/drawing/2010/main" val="0"/>
               </a:ext>
             </a:extLst>
           </a:blip>
-          <a:srcRect r="17533"/>
-          <a:stretch/>
+          <a:stretch>
+            <a:fillRect/>
+          </a:stretch>
         </p:blipFill>
         <p:spPr>
           <a:xfrm>
-            <a:off x="4238751" y="1917290"/>
-            <a:ext cx="7672048" cy="4651566"/>
+            <a:off x="1663964" y="2060033"/>
+            <a:ext cx="9166223" cy="4267940"/>
           </a:xfrm>
           <a:prstGeom prst="rect">
             <a:avLst/>
@@ -24908,8 +24909,8 @@
           </a:p>
         </p:txBody>
       </p:sp>
-      <mc:AlternateContent xmlns:mc="http://schemas.openxmlformats.org/markup-compatibility/2006">
-        <mc:Choice xmlns:a14="http://schemas.microsoft.com/office/drawing/2010/main" Requires="a14">
+      <mc:AlternateContent xmlns:mc="http://schemas.openxmlformats.org/markup-compatibility/2006" xmlns:a14="http://schemas.microsoft.com/office/drawing/2010/main">
+        <mc:Choice Requires="a14">
           <p:sp>
             <p:nvSpPr>
               <p:cNvPr id="4" name="TextBox 3">
@@ -25048,7 +25049,7 @@
             </p:txBody>
           </p:sp>
         </mc:Choice>
-        <mc:Fallback>
+        <mc:Fallback xmlns="">
           <p:sp>
             <p:nvSpPr>
               <p:cNvPr id="4" name="TextBox 3">

</xml_diff>